<commit_message>
substantial changes to the allelic filter script
- XS filter did not work as expected
- in the case of paired-end sequencing: if one read matches the
criteria, then the pair is kept
- added coordinate sorting as an option
- duplicates are ignored, so are unmapped reads
- added mapping quality as an additional option (might be less
complicated than removal of multiply aligned reads for paired-end data)
- non-indexed BAM files are accepted now (avoid use of infile.fetch()
that relies on the index)
</commit_message>
<xml_diff>
--- a/images/imagesAlleleSpec.pptx
+++ b/images/imagesAlleleSpec.pptx
@@ -5,10 +5,12 @@
     <p:sldMasterId id="2147483648" r:id="rId1"/>
   </p:sldMasterIdLst>
   <p:notesMasterIdLst>
-    <p:notesMasterId r:id="rId3"/>
+    <p:notesMasterId r:id="rId5"/>
   </p:notesMasterIdLst>
   <p:sldIdLst>
     <p:sldId id="257" r:id="rId2"/>
+    <p:sldId id="258" r:id="rId3"/>
+    <p:sldId id="259" r:id="rId4"/>
   </p:sldIdLst>
   <p:sldSz cx="9144000" cy="6858000" type="screen4x3"/>
   <p:notesSz cx="6858000" cy="9144000"/>
@@ -192,7 +194,8 @@
           <a:p>
             <a:fld id="{885A4CDE-30F4-48B5-9C15-59F9F4EEB033}" type="datetimeFigureOut">
               <a:rPr lang="en-US" smtClean="0"/>
-              <a:t>7/28/2014</a:t>
+              <a:pPr/>
+              <a:t>8/7/2014</a:t>
             </a:fld>
             <a:endParaRPr lang="en-US"/>
           </a:p>
@@ -351,7 +354,8 @@
           <a:p>
             <a:fld id="{A99447D6-EAB9-47C2-AAEC-683839A44C0B}" type="slidenum">
               <a:rPr lang="en-US" smtClean="0"/>
-              <a:t>‹#›</a:t>
+              <a:pPr/>
+              <a:t>‹Nr.›</a:t>
             </a:fld>
             <a:endParaRPr lang="en-US"/>
           </a:p>
@@ -360,7 +364,7 @@
     </p:spTree>
     <p:extLst>
       <p:ext uri="{BB962C8B-B14F-4D97-AF65-F5344CB8AC3E}">
-        <p14:creationId xmlns:p14="http://schemas.microsoft.com/office/powerpoint/2010/main" val="3209617471"/>
+        <p14:creationId xmlns:p14="http://schemas.microsoft.com/office/powerpoint/2010/main" xmlns="" val="3209617471"/>
       </p:ext>
     </p:extLst>
   </p:cSld>
@@ -535,6 +539,7 @@
           <a:p>
             <a:fld id="{8FFE0C0D-B588-42FF-BEBC-F3BF5A574766}" type="slidenum">
               <a:rPr lang="en-US" smtClean="0"/>
+              <a:pPr/>
               <a:t>1</a:t>
             </a:fld>
             <a:endParaRPr lang="en-US"/>
@@ -544,7 +549,7 @@
     </p:spTree>
     <p:extLst>
       <p:ext uri="{BB962C8B-B14F-4D97-AF65-F5344CB8AC3E}">
-        <p14:creationId xmlns:p14="http://schemas.microsoft.com/office/powerpoint/2010/main" val="4153860162"/>
+        <p14:creationId xmlns:p14="http://schemas.microsoft.com/office/powerpoint/2010/main" xmlns="" val="4153860162"/>
       </p:ext>
     </p:extLst>
   </p:cSld>
@@ -735,7 +740,8 @@
           <a:p>
             <a:fld id="{1B057B5C-F346-468C-B96F-038FE5DB9D36}" type="datetimeFigureOut">
               <a:rPr lang="en-US" smtClean="0"/>
-              <a:t>7/28/2014</a:t>
+              <a:pPr/>
+              <a:t>8/7/2014</a:t>
             </a:fld>
             <a:endParaRPr lang="en-US"/>
           </a:p>
@@ -777,7 +783,8 @@
           <a:p>
             <a:fld id="{323A35CB-9EEE-4E6F-8664-3372E4F0716E}" type="slidenum">
               <a:rPr lang="en-US" smtClean="0"/>
-              <a:t>‹#›</a:t>
+              <a:pPr/>
+              <a:t>‹Nr.›</a:t>
             </a:fld>
             <a:endParaRPr lang="en-US"/>
           </a:p>
@@ -786,7 +793,7 @@
     </p:spTree>
     <p:extLst>
       <p:ext uri="{BB962C8B-B14F-4D97-AF65-F5344CB8AC3E}">
-        <p14:creationId xmlns:p14="http://schemas.microsoft.com/office/powerpoint/2010/main" val="1916449863"/>
+        <p14:creationId xmlns:p14="http://schemas.microsoft.com/office/powerpoint/2010/main" xmlns="" val="1916449863"/>
       </p:ext>
     </p:extLst>
   </p:cSld>
@@ -905,7 +912,8 @@
           <a:p>
             <a:fld id="{1B057B5C-F346-468C-B96F-038FE5DB9D36}" type="datetimeFigureOut">
               <a:rPr lang="en-US" smtClean="0"/>
-              <a:t>7/28/2014</a:t>
+              <a:pPr/>
+              <a:t>8/7/2014</a:t>
             </a:fld>
             <a:endParaRPr lang="en-US"/>
           </a:p>
@@ -947,7 +955,8 @@
           <a:p>
             <a:fld id="{323A35CB-9EEE-4E6F-8664-3372E4F0716E}" type="slidenum">
               <a:rPr lang="en-US" smtClean="0"/>
-              <a:t>‹#›</a:t>
+              <a:pPr/>
+              <a:t>‹Nr.›</a:t>
             </a:fld>
             <a:endParaRPr lang="en-US"/>
           </a:p>
@@ -956,7 +965,7 @@
     </p:spTree>
     <p:extLst>
       <p:ext uri="{BB962C8B-B14F-4D97-AF65-F5344CB8AC3E}">
-        <p14:creationId xmlns:p14="http://schemas.microsoft.com/office/powerpoint/2010/main" val="1145034215"/>
+        <p14:creationId xmlns:p14="http://schemas.microsoft.com/office/powerpoint/2010/main" xmlns="" val="1145034215"/>
       </p:ext>
     </p:extLst>
   </p:cSld>
@@ -1085,7 +1094,8 @@
           <a:p>
             <a:fld id="{1B057B5C-F346-468C-B96F-038FE5DB9D36}" type="datetimeFigureOut">
               <a:rPr lang="en-US" smtClean="0"/>
-              <a:t>7/28/2014</a:t>
+              <a:pPr/>
+              <a:t>8/7/2014</a:t>
             </a:fld>
             <a:endParaRPr lang="en-US"/>
           </a:p>
@@ -1127,7 +1137,8 @@
           <a:p>
             <a:fld id="{323A35CB-9EEE-4E6F-8664-3372E4F0716E}" type="slidenum">
               <a:rPr lang="en-US" smtClean="0"/>
-              <a:t>‹#›</a:t>
+              <a:pPr/>
+              <a:t>‹Nr.›</a:t>
             </a:fld>
             <a:endParaRPr lang="en-US"/>
           </a:p>
@@ -1136,7 +1147,7 @@
     </p:spTree>
     <p:extLst>
       <p:ext uri="{BB962C8B-B14F-4D97-AF65-F5344CB8AC3E}">
-        <p14:creationId xmlns:p14="http://schemas.microsoft.com/office/powerpoint/2010/main" val="362043753"/>
+        <p14:creationId xmlns:p14="http://schemas.microsoft.com/office/powerpoint/2010/main" xmlns="" val="362043753"/>
       </p:ext>
     </p:extLst>
   </p:cSld>
@@ -1255,7 +1266,8 @@
           <a:p>
             <a:fld id="{1B057B5C-F346-468C-B96F-038FE5DB9D36}" type="datetimeFigureOut">
               <a:rPr lang="en-US" smtClean="0"/>
-              <a:t>7/28/2014</a:t>
+              <a:pPr/>
+              <a:t>8/7/2014</a:t>
             </a:fld>
             <a:endParaRPr lang="en-US"/>
           </a:p>
@@ -1297,7 +1309,8 @@
           <a:p>
             <a:fld id="{323A35CB-9EEE-4E6F-8664-3372E4F0716E}" type="slidenum">
               <a:rPr lang="en-US" smtClean="0"/>
-              <a:t>‹#›</a:t>
+              <a:pPr/>
+              <a:t>‹Nr.›</a:t>
             </a:fld>
             <a:endParaRPr lang="en-US"/>
           </a:p>
@@ -1306,7 +1319,7 @@
     </p:spTree>
     <p:extLst>
       <p:ext uri="{BB962C8B-B14F-4D97-AF65-F5344CB8AC3E}">
-        <p14:creationId xmlns:p14="http://schemas.microsoft.com/office/powerpoint/2010/main" val="2687009016"/>
+        <p14:creationId xmlns:p14="http://schemas.microsoft.com/office/powerpoint/2010/main" xmlns="" val="2687009016"/>
       </p:ext>
     </p:extLst>
   </p:cSld>
@@ -1501,7 +1514,8 @@
           <a:p>
             <a:fld id="{1B057B5C-F346-468C-B96F-038FE5DB9D36}" type="datetimeFigureOut">
               <a:rPr lang="en-US" smtClean="0"/>
-              <a:t>7/28/2014</a:t>
+              <a:pPr/>
+              <a:t>8/7/2014</a:t>
             </a:fld>
             <a:endParaRPr lang="en-US"/>
           </a:p>
@@ -1543,7 +1557,8 @@
           <a:p>
             <a:fld id="{323A35CB-9EEE-4E6F-8664-3372E4F0716E}" type="slidenum">
               <a:rPr lang="en-US" smtClean="0"/>
-              <a:t>‹#›</a:t>
+              <a:pPr/>
+              <a:t>‹Nr.›</a:t>
             </a:fld>
             <a:endParaRPr lang="en-US"/>
           </a:p>
@@ -1552,7 +1567,7 @@
     </p:spTree>
     <p:extLst>
       <p:ext uri="{BB962C8B-B14F-4D97-AF65-F5344CB8AC3E}">
-        <p14:creationId xmlns:p14="http://schemas.microsoft.com/office/powerpoint/2010/main" val="205719649"/>
+        <p14:creationId xmlns:p14="http://schemas.microsoft.com/office/powerpoint/2010/main" xmlns="" val="205719649"/>
       </p:ext>
     </p:extLst>
   </p:cSld>
@@ -1789,7 +1804,8 @@
           <a:p>
             <a:fld id="{1B057B5C-F346-468C-B96F-038FE5DB9D36}" type="datetimeFigureOut">
               <a:rPr lang="en-US" smtClean="0"/>
-              <a:t>7/28/2014</a:t>
+              <a:pPr/>
+              <a:t>8/7/2014</a:t>
             </a:fld>
             <a:endParaRPr lang="en-US"/>
           </a:p>
@@ -1831,7 +1847,8 @@
           <a:p>
             <a:fld id="{323A35CB-9EEE-4E6F-8664-3372E4F0716E}" type="slidenum">
               <a:rPr lang="en-US" smtClean="0"/>
-              <a:t>‹#›</a:t>
+              <a:pPr/>
+              <a:t>‹Nr.›</a:t>
             </a:fld>
             <a:endParaRPr lang="en-US"/>
           </a:p>
@@ -1840,7 +1857,7 @@
     </p:spTree>
     <p:extLst>
       <p:ext uri="{BB962C8B-B14F-4D97-AF65-F5344CB8AC3E}">
-        <p14:creationId xmlns:p14="http://schemas.microsoft.com/office/powerpoint/2010/main" val="2547244101"/>
+        <p14:creationId xmlns:p14="http://schemas.microsoft.com/office/powerpoint/2010/main" xmlns="" val="2547244101"/>
       </p:ext>
     </p:extLst>
   </p:cSld>
@@ -2211,7 +2228,8 @@
           <a:p>
             <a:fld id="{1B057B5C-F346-468C-B96F-038FE5DB9D36}" type="datetimeFigureOut">
               <a:rPr lang="en-US" smtClean="0"/>
-              <a:t>7/28/2014</a:t>
+              <a:pPr/>
+              <a:t>8/7/2014</a:t>
             </a:fld>
             <a:endParaRPr lang="en-US"/>
           </a:p>
@@ -2253,7 +2271,8 @@
           <a:p>
             <a:fld id="{323A35CB-9EEE-4E6F-8664-3372E4F0716E}" type="slidenum">
               <a:rPr lang="en-US" smtClean="0"/>
-              <a:t>‹#›</a:t>
+              <a:pPr/>
+              <a:t>‹Nr.›</a:t>
             </a:fld>
             <a:endParaRPr lang="en-US"/>
           </a:p>
@@ -2262,7 +2281,7 @@
     </p:spTree>
     <p:extLst>
       <p:ext uri="{BB962C8B-B14F-4D97-AF65-F5344CB8AC3E}">
-        <p14:creationId xmlns:p14="http://schemas.microsoft.com/office/powerpoint/2010/main" val="2623525869"/>
+        <p14:creationId xmlns:p14="http://schemas.microsoft.com/office/powerpoint/2010/main" xmlns="" val="2623525869"/>
       </p:ext>
     </p:extLst>
   </p:cSld>
@@ -2329,7 +2348,8 @@
           <a:p>
             <a:fld id="{1B057B5C-F346-468C-B96F-038FE5DB9D36}" type="datetimeFigureOut">
               <a:rPr lang="en-US" smtClean="0"/>
-              <a:t>7/28/2014</a:t>
+              <a:pPr/>
+              <a:t>8/7/2014</a:t>
             </a:fld>
             <a:endParaRPr lang="en-US"/>
           </a:p>
@@ -2371,7 +2391,8 @@
           <a:p>
             <a:fld id="{323A35CB-9EEE-4E6F-8664-3372E4F0716E}" type="slidenum">
               <a:rPr lang="en-US" smtClean="0"/>
-              <a:t>‹#›</a:t>
+              <a:pPr/>
+              <a:t>‹Nr.›</a:t>
             </a:fld>
             <a:endParaRPr lang="en-US"/>
           </a:p>
@@ -2380,7 +2401,7 @@
     </p:spTree>
     <p:extLst>
       <p:ext uri="{BB962C8B-B14F-4D97-AF65-F5344CB8AC3E}">
-        <p14:creationId xmlns:p14="http://schemas.microsoft.com/office/powerpoint/2010/main" val="2624634082"/>
+        <p14:creationId xmlns:p14="http://schemas.microsoft.com/office/powerpoint/2010/main" xmlns="" val="2624634082"/>
       </p:ext>
     </p:extLst>
   </p:cSld>
@@ -2424,7 +2445,8 @@
           <a:p>
             <a:fld id="{1B057B5C-F346-468C-B96F-038FE5DB9D36}" type="datetimeFigureOut">
               <a:rPr lang="en-US" smtClean="0"/>
-              <a:t>7/28/2014</a:t>
+              <a:pPr/>
+              <a:t>8/7/2014</a:t>
             </a:fld>
             <a:endParaRPr lang="en-US"/>
           </a:p>
@@ -2466,7 +2488,8 @@
           <a:p>
             <a:fld id="{323A35CB-9EEE-4E6F-8664-3372E4F0716E}" type="slidenum">
               <a:rPr lang="en-US" smtClean="0"/>
-              <a:t>‹#›</a:t>
+              <a:pPr/>
+              <a:t>‹Nr.›</a:t>
             </a:fld>
             <a:endParaRPr lang="en-US"/>
           </a:p>
@@ -2475,7 +2498,7 @@
     </p:spTree>
     <p:extLst>
       <p:ext uri="{BB962C8B-B14F-4D97-AF65-F5344CB8AC3E}">
-        <p14:creationId xmlns:p14="http://schemas.microsoft.com/office/powerpoint/2010/main" val="388491520"/>
+        <p14:creationId xmlns:p14="http://schemas.microsoft.com/office/powerpoint/2010/main" xmlns="" val="388491520"/>
       </p:ext>
     </p:extLst>
   </p:cSld>
@@ -2701,7 +2724,8 @@
           <a:p>
             <a:fld id="{1B057B5C-F346-468C-B96F-038FE5DB9D36}" type="datetimeFigureOut">
               <a:rPr lang="en-US" smtClean="0"/>
-              <a:t>7/28/2014</a:t>
+              <a:pPr/>
+              <a:t>8/7/2014</a:t>
             </a:fld>
             <a:endParaRPr lang="en-US"/>
           </a:p>
@@ -2743,7 +2767,8 @@
           <a:p>
             <a:fld id="{323A35CB-9EEE-4E6F-8664-3372E4F0716E}" type="slidenum">
               <a:rPr lang="en-US" smtClean="0"/>
-              <a:t>‹#›</a:t>
+              <a:pPr/>
+              <a:t>‹Nr.›</a:t>
             </a:fld>
             <a:endParaRPr lang="en-US"/>
           </a:p>
@@ -2752,7 +2777,7 @@
     </p:spTree>
     <p:extLst>
       <p:ext uri="{BB962C8B-B14F-4D97-AF65-F5344CB8AC3E}">
-        <p14:creationId xmlns:p14="http://schemas.microsoft.com/office/powerpoint/2010/main" val="1277729367"/>
+        <p14:creationId xmlns:p14="http://schemas.microsoft.com/office/powerpoint/2010/main" xmlns="" val="1277729367"/>
       </p:ext>
     </p:extLst>
   </p:cSld>
@@ -2954,7 +2979,8 @@
           <a:p>
             <a:fld id="{1B057B5C-F346-468C-B96F-038FE5DB9D36}" type="datetimeFigureOut">
               <a:rPr lang="en-US" smtClean="0"/>
-              <a:t>7/28/2014</a:t>
+              <a:pPr/>
+              <a:t>8/7/2014</a:t>
             </a:fld>
             <a:endParaRPr lang="en-US"/>
           </a:p>
@@ -2996,7 +3022,8 @@
           <a:p>
             <a:fld id="{323A35CB-9EEE-4E6F-8664-3372E4F0716E}" type="slidenum">
               <a:rPr lang="en-US" smtClean="0"/>
-              <a:t>‹#›</a:t>
+              <a:pPr/>
+              <a:t>‹Nr.›</a:t>
             </a:fld>
             <a:endParaRPr lang="en-US"/>
           </a:p>
@@ -3005,7 +3032,7 @@
     </p:spTree>
     <p:extLst>
       <p:ext uri="{BB962C8B-B14F-4D97-AF65-F5344CB8AC3E}">
-        <p14:creationId xmlns:p14="http://schemas.microsoft.com/office/powerpoint/2010/main" val="1673154904"/>
+        <p14:creationId xmlns:p14="http://schemas.microsoft.com/office/powerpoint/2010/main" xmlns="" val="1673154904"/>
       </p:ext>
     </p:extLst>
   </p:cSld>
@@ -3167,7 +3194,8 @@
           <a:p>
             <a:fld id="{1B057B5C-F346-468C-B96F-038FE5DB9D36}" type="datetimeFigureOut">
               <a:rPr lang="en-US" smtClean="0"/>
-              <a:t>7/28/2014</a:t>
+              <a:pPr/>
+              <a:t>8/7/2014</a:t>
             </a:fld>
             <a:endParaRPr lang="en-US"/>
           </a:p>
@@ -3245,7 +3273,8 @@
           <a:p>
             <a:fld id="{323A35CB-9EEE-4E6F-8664-3372E4F0716E}" type="slidenum">
               <a:rPr lang="en-US" smtClean="0"/>
-              <a:t>‹#›</a:t>
+              <a:pPr/>
+              <a:t>‹Nr.›</a:t>
             </a:fld>
             <a:endParaRPr lang="en-US"/>
           </a:p>
@@ -3254,7 +3283,7 @@
     </p:spTree>
     <p:extLst>
       <p:ext uri="{BB962C8B-B14F-4D97-AF65-F5344CB8AC3E}">
-        <p14:creationId xmlns:p14="http://schemas.microsoft.com/office/powerpoint/2010/main" val="3092001663"/>
+        <p14:creationId xmlns:p14="http://schemas.microsoft.com/office/powerpoint/2010/main" xmlns="" val="3092001663"/>
       </p:ext>
     </p:extLst>
   </p:cSld>
@@ -3597,10 +3626,10 @@
           <p:nvPr/>
         </p:nvPicPr>
         <p:blipFill>
-          <a:blip r:embed="rId3">
+          <a:blip r:embed="rId3" cstate="print">
             <a:extLst>
               <a:ext uri="{28A0092B-C50C-407E-A947-70E740481C1C}">
-                <a14:useLocalDpi xmlns:a14="http://schemas.microsoft.com/office/drawing/2010/main" val="0"/>
+                <a14:useLocalDpi xmlns:a14="http://schemas.microsoft.com/office/drawing/2010/main" xmlns="" val="0"/>
               </a:ext>
             </a:extLst>
           </a:blip>
@@ -3623,14 +3652,14 @@
           </a:ln>
           <a:extLst>
             <a:ext uri="{909E8E84-426E-40DD-AFC4-6F175D3DCCD1}">
-              <a14:hiddenFill xmlns:a14="http://schemas.microsoft.com/office/drawing/2010/main">
+              <a14:hiddenFill xmlns:a14="http://schemas.microsoft.com/office/drawing/2010/main" xmlns="">
                 <a:solidFill>
                   <a:schemeClr val="accent1"/>
                 </a:solidFill>
               </a14:hiddenFill>
             </a:ext>
             <a:ext uri="{91240B29-F687-4F45-9708-019B960494DF}">
-              <a14:hiddenLine xmlns:a14="http://schemas.microsoft.com/office/drawing/2010/main" w="9525">
+              <a14:hiddenLine xmlns:a14="http://schemas.microsoft.com/office/drawing/2010/main" xmlns="" w="9525">
                 <a:solidFill>
                   <a:schemeClr val="tx1"/>
                 </a:solidFill>
@@ -4111,10 +4140,1046 @@
           </a:p>
         </p:txBody>
       </p:sp>
+      <p:sp>
+        <p:nvSpPr>
+          <p:cNvPr id="15" name="Textfeld 14"/>
+          <p:cNvSpPr txBox="1"/>
+          <p:nvPr/>
+        </p:nvSpPr>
+        <p:spPr>
+          <a:xfrm>
+            <a:off x="4114800" y="3657600"/>
+            <a:ext cx="2539798" cy="369332"/>
+          </a:xfrm>
+          <a:prstGeom prst="rect">
+            <a:avLst/>
+          </a:prstGeom>
+          <a:solidFill>
+            <a:schemeClr val="bg1"/>
+          </a:solidFill>
+        </p:spPr>
+        <p:txBody>
+          <a:bodyPr wrap="none" rtlCol="0">
+            <a:spAutoFit/>
+          </a:bodyPr>
+          <a:lstStyle/>
+          <a:p>
+            <a:r>
+              <a:rPr lang="en-US" smtClean="0"/>
+              <a:t>remove unmapped reads</a:t>
+            </a:r>
+            <a:endParaRPr lang="de-DE"/>
+          </a:p>
+        </p:txBody>
+      </p:sp>
     </p:spTree>
     <p:extLst>
       <p:ext uri="{BB962C8B-B14F-4D97-AF65-F5344CB8AC3E}">
-        <p14:creationId xmlns:p14="http://schemas.microsoft.com/office/powerpoint/2010/main" val="3210360479"/>
+        <p14:creationId xmlns:p14="http://schemas.microsoft.com/office/powerpoint/2010/main" xmlns="" val="3210360479"/>
+      </p:ext>
+    </p:extLst>
+  </p:cSld>
+  <p:clrMapOvr>
+    <a:masterClrMapping/>
+  </p:clrMapOvr>
+</p:sld>
+</file>
+
+<file path=ppt/slides/slide2.xml><?xml version="1.0" encoding="utf-8"?>
+<p:sld xmlns:a="http://schemas.openxmlformats.org/drawingml/2006/main" xmlns:r="http://schemas.openxmlformats.org/officeDocument/2006/relationships" xmlns:p="http://schemas.openxmlformats.org/presentationml/2006/main">
+  <p:cSld>
+    <p:spTree>
+      <p:nvGrpSpPr>
+        <p:cNvPr id="1" name=""/>
+        <p:cNvGrpSpPr/>
+        <p:nvPr/>
+      </p:nvGrpSpPr>
+      <p:grpSpPr>
+        <a:xfrm>
+          <a:off x="0" y="0"/>
+          <a:ext cx="0" cy="0"/>
+          <a:chOff x="0" y="0"/>
+          <a:chExt cx="0" cy="0"/>
+        </a:xfrm>
+      </p:grpSpPr>
+      <p:sp>
+        <p:nvSpPr>
+          <p:cNvPr id="2" name="TextBox 1"/>
+          <p:cNvSpPr txBox="1"/>
+          <p:nvPr/>
+        </p:nvSpPr>
+        <p:spPr>
+          <a:xfrm>
+            <a:off x="3124200" y="609600"/>
+            <a:ext cx="2988190" cy="584775"/>
+          </a:xfrm>
+          <a:prstGeom prst="rect">
+            <a:avLst/>
+          </a:prstGeom>
+          <a:solidFill>
+            <a:schemeClr val="bg1">
+              <a:lumMod val="95000"/>
+            </a:schemeClr>
+          </a:solidFill>
+        </p:spPr>
+        <p:txBody>
+          <a:bodyPr wrap="none" rtlCol="0">
+            <a:spAutoFit/>
+          </a:bodyPr>
+          <a:lstStyle/>
+          <a:p>
+            <a:pPr algn="ctr"/>
+            <a:r>
+              <a:rPr lang="en-GB" sz="1600" b="1" dirty="0" smtClean="0">
+                <a:solidFill>
+                  <a:srgbClr val="002060"/>
+                </a:solidFill>
+              </a:rPr>
+              <a:t>Part III:</a:t>
+            </a:r>
+            <a:endParaRPr lang="en-GB" sz="1600" dirty="0" smtClean="0">
+              <a:solidFill>
+                <a:srgbClr val="002060"/>
+              </a:solidFill>
+            </a:endParaRPr>
+          </a:p>
+          <a:p>
+            <a:pPr algn="ctr"/>
+            <a:r>
+              <a:rPr lang="en-GB" sz="1600" dirty="0" smtClean="0">
+                <a:solidFill>
+                  <a:srgbClr val="002060"/>
+                </a:solidFill>
+              </a:rPr>
+              <a:t>counting maternal/paternal reads</a:t>
+            </a:r>
+            <a:endParaRPr lang="en-US" sz="1600" dirty="0">
+              <a:solidFill>
+                <a:srgbClr val="002060"/>
+              </a:solidFill>
+            </a:endParaRPr>
+          </a:p>
+        </p:txBody>
+      </p:sp>
+      <p:sp>
+        <p:nvSpPr>
+          <p:cNvPr id="11" name="TextBox 10"/>
+          <p:cNvSpPr txBox="1"/>
+          <p:nvPr/>
+        </p:nvSpPr>
+        <p:spPr>
+          <a:xfrm>
+            <a:off x="6324600" y="1701602"/>
+            <a:ext cx="2362200" cy="1938992"/>
+          </a:xfrm>
+          <a:prstGeom prst="rect">
+            <a:avLst/>
+          </a:prstGeom>
+          <a:noFill/>
+          <a:ln>
+            <a:solidFill>
+              <a:schemeClr val="accent1"/>
+            </a:solidFill>
+          </a:ln>
+        </p:spPr>
+        <p:txBody>
+          <a:bodyPr wrap="square" rtlCol="0">
+            <a:spAutoFit/>
+          </a:bodyPr>
+          <a:lstStyle/>
+          <a:p>
+            <a:pPr>
+              <a:spcBef>
+                <a:spcPts val="600"/>
+              </a:spcBef>
+              <a:spcAft>
+                <a:spcPts val="600"/>
+              </a:spcAft>
+            </a:pPr>
+            <a:r>
+              <a:rPr lang="en-GB" dirty="0" smtClean="0"/>
+              <a:t>filters:</a:t>
+            </a:r>
+          </a:p>
+          <a:p>
+            <a:pPr marL="285750" indent="-285750">
+              <a:spcBef>
+                <a:spcPts val="600"/>
+              </a:spcBef>
+              <a:spcAft>
+                <a:spcPts val="600"/>
+              </a:spcAft>
+              <a:buFontTx/>
+              <a:buChar char="-"/>
+            </a:pPr>
+            <a:r>
+              <a:rPr lang="en-GB" dirty="0" smtClean="0"/>
+              <a:t>multiple alignments (XS flag, NH flag)</a:t>
+            </a:r>
+          </a:p>
+          <a:p>
+            <a:pPr marL="285750" indent="-285750">
+              <a:spcBef>
+                <a:spcPts val="600"/>
+              </a:spcBef>
+              <a:spcAft>
+                <a:spcPts val="600"/>
+              </a:spcAft>
+              <a:buFontTx/>
+              <a:buChar char="-"/>
+            </a:pPr>
+            <a:r>
+              <a:rPr lang="en-GB" dirty="0" smtClean="0"/>
+              <a:t>mapping quality</a:t>
+            </a:r>
+            <a:endParaRPr lang="en-US" dirty="0" smtClean="0"/>
+          </a:p>
+          <a:p>
+            <a:pPr marL="285750" indent="-285750">
+              <a:spcBef>
+                <a:spcPts val="600"/>
+              </a:spcBef>
+              <a:spcAft>
+                <a:spcPts val="600"/>
+              </a:spcAft>
+              <a:buFontTx/>
+              <a:buChar char="-"/>
+            </a:pPr>
+            <a:r>
+              <a:rPr lang="en-GB" dirty="0" smtClean="0"/>
+              <a:t>duplicates</a:t>
+            </a:r>
+          </a:p>
+        </p:txBody>
+      </p:sp>
+      <p:sp>
+        <p:nvSpPr>
+          <p:cNvPr id="12" name="TextBox 11"/>
+          <p:cNvSpPr txBox="1"/>
+          <p:nvPr/>
+        </p:nvSpPr>
+        <p:spPr>
+          <a:xfrm>
+            <a:off x="381000" y="3178076"/>
+            <a:ext cx="7671524" cy="2862322"/>
+          </a:xfrm>
+          <a:prstGeom prst="rect">
+            <a:avLst/>
+          </a:prstGeom>
+          <a:noFill/>
+        </p:spPr>
+        <p:txBody>
+          <a:bodyPr wrap="none" rtlCol="0">
+            <a:spAutoFit/>
+          </a:bodyPr>
+          <a:lstStyle/>
+          <a:p>
+            <a:r>
+              <a:rPr lang="en-GB" dirty="0" smtClean="0"/>
+              <a:t>suspenders</a:t>
+            </a:r>
+          </a:p>
+          <a:p>
+            <a:endParaRPr lang="en-GB" dirty="0"/>
+          </a:p>
+          <a:p>
+            <a:r>
+              <a:rPr lang="en-GB" dirty="0" smtClean="0"/>
+              <a:t>mark duplicates</a:t>
+            </a:r>
+          </a:p>
+          <a:p>
+            <a:endParaRPr lang="en-GB" dirty="0"/>
+          </a:p>
+          <a:p>
+            <a:r>
+              <a:rPr lang="en-GB" dirty="0" smtClean="0"/>
+              <a:t>allelic filter.py on mark duplicates output</a:t>
+            </a:r>
+          </a:p>
+          <a:p>
+            <a:endParaRPr lang="en-GB" dirty="0"/>
+          </a:p>
+          <a:p>
+            <a:r>
+              <a:rPr lang="en-GB" dirty="0" err="1" smtClean="0"/>
+              <a:t>featureCounts</a:t>
+            </a:r>
+            <a:r>
+              <a:rPr lang="en-GB" dirty="0" smtClean="0"/>
+              <a:t> on </a:t>
+            </a:r>
+            <a:r>
+              <a:rPr lang="en-GB" dirty="0" err="1" smtClean="0"/>
+              <a:t>allelically</a:t>
+            </a:r>
+            <a:r>
+              <a:rPr lang="en-GB" dirty="0" smtClean="0"/>
+              <a:t> filtered files (ignore Duplicates, set mapping quality)</a:t>
+            </a:r>
+          </a:p>
+          <a:p>
+            <a:endParaRPr lang="en-GB" dirty="0"/>
+          </a:p>
+          <a:p>
+            <a:r>
+              <a:rPr lang="en-GB" dirty="0" err="1" smtClean="0"/>
+              <a:t>DESeq</a:t>
+            </a:r>
+            <a:r>
+              <a:rPr lang="en-GB" dirty="0" smtClean="0"/>
+              <a:t> </a:t>
+            </a:r>
+          </a:p>
+          <a:p>
+            <a:endParaRPr lang="en-US" dirty="0"/>
+          </a:p>
+        </p:txBody>
+      </p:sp>
+      <p:sp>
+        <p:nvSpPr>
+          <p:cNvPr id="14" name="TextBox 13"/>
+          <p:cNvSpPr txBox="1"/>
+          <p:nvPr/>
+        </p:nvSpPr>
+        <p:spPr>
+          <a:xfrm>
+            <a:off x="4953000" y="4424571"/>
+            <a:ext cx="1834092" cy="369332"/>
+          </a:xfrm>
+          <a:prstGeom prst="rect">
+            <a:avLst/>
+          </a:prstGeom>
+          <a:noFill/>
+        </p:spPr>
+        <p:txBody>
+          <a:bodyPr wrap="none" rtlCol="0">
+            <a:spAutoFit/>
+          </a:bodyPr>
+          <a:lstStyle/>
+          <a:p>
+            <a:r>
+              <a:rPr lang="en-GB" dirty="0" smtClean="0">
+                <a:solidFill>
+                  <a:schemeClr val="bg1">
+                    <a:lumMod val="50000"/>
+                  </a:schemeClr>
+                </a:solidFill>
+              </a:rPr>
+              <a:t>sorting/indexing?</a:t>
+            </a:r>
+            <a:endParaRPr lang="en-US" dirty="0">
+              <a:solidFill>
+                <a:schemeClr val="bg1">
+                  <a:lumMod val="50000"/>
+                </a:schemeClr>
+              </a:solidFill>
+            </a:endParaRPr>
+          </a:p>
+        </p:txBody>
+      </p:sp>
+      <p:sp>
+        <p:nvSpPr>
+          <p:cNvPr id="15" name="TextBox 14"/>
+          <p:cNvSpPr txBox="1"/>
+          <p:nvPr/>
+        </p:nvSpPr>
+        <p:spPr>
+          <a:xfrm>
+            <a:off x="9677400" y="4793903"/>
+            <a:ext cx="1744067" cy="646331"/>
+          </a:xfrm>
+          <a:prstGeom prst="rect">
+            <a:avLst/>
+          </a:prstGeom>
+          <a:noFill/>
+        </p:spPr>
+        <p:txBody>
+          <a:bodyPr wrap="none" rtlCol="0">
+            <a:spAutoFit/>
+          </a:bodyPr>
+          <a:lstStyle/>
+          <a:p>
+            <a:r>
+              <a:rPr lang="en-GB" dirty="0" smtClean="0"/>
+              <a:t>variant overlaps:</a:t>
+            </a:r>
+          </a:p>
+          <a:p>
+            <a:r>
+              <a:rPr lang="en-GB" smtClean="0"/>
+              <a:t>- </a:t>
+            </a:r>
+            <a:endParaRPr lang="en-US"/>
+          </a:p>
+        </p:txBody>
+      </p:sp>
+    </p:spTree>
+    <p:extLst>
+      <p:ext uri="{BB962C8B-B14F-4D97-AF65-F5344CB8AC3E}">
+        <p14:creationId xmlns:p14="http://schemas.microsoft.com/office/powerpoint/2010/main" xmlns="" val="264209621"/>
+      </p:ext>
+    </p:extLst>
+  </p:cSld>
+  <p:clrMapOvr>
+    <a:masterClrMapping/>
+  </p:clrMapOvr>
+</p:sld>
+</file>
+
+<file path=ppt/slides/slide3.xml><?xml version="1.0" encoding="utf-8"?>
+<p:sld xmlns:a="http://schemas.openxmlformats.org/drawingml/2006/main" xmlns:r="http://schemas.openxmlformats.org/officeDocument/2006/relationships" xmlns:p="http://schemas.openxmlformats.org/presentationml/2006/main">
+  <p:cSld>
+    <p:spTree>
+      <p:nvGrpSpPr>
+        <p:cNvPr id="1" name=""/>
+        <p:cNvGrpSpPr/>
+        <p:nvPr/>
+      </p:nvGrpSpPr>
+      <p:grpSpPr>
+        <a:xfrm>
+          <a:off x="0" y="0"/>
+          <a:ext cx="0" cy="0"/>
+          <a:chOff x="0" y="0"/>
+          <a:chExt cx="0" cy="0"/>
+        </a:xfrm>
+      </p:grpSpPr>
+      <p:graphicFrame>
+        <p:nvGraphicFramePr>
+          <p:cNvPr id="2" name="Table 1"/>
+          <p:cNvGraphicFramePr>
+            <a:graphicFrameLocks noGrp="1"/>
+          </p:cNvGraphicFramePr>
+          <p:nvPr>
+            <p:extLst>
+              <p:ext uri="{D42A27DB-BD31-4B8C-83A1-F6EECF244321}">
+                <p14:modId xmlns:p14="http://schemas.microsoft.com/office/powerpoint/2010/main" xmlns="" val="1874173087"/>
+              </p:ext>
+            </p:extLst>
+          </p:nvPr>
+        </p:nvGraphicFramePr>
+        <p:xfrm>
+          <a:off x="-609598" y="1828800"/>
+          <a:ext cx="9753598" cy="3520440"/>
+        </p:xfrm>
+        <a:graphic>
+          <a:graphicData uri="http://schemas.openxmlformats.org/drawingml/2006/table">
+            <a:tbl>
+              <a:tblPr firstRow="1" bandRow="1">
+                <a:tableStyleId>{69012ECD-51FC-41F1-AA8D-1B2483CD663E}</a:tableStyleId>
+              </a:tblPr>
+              <a:tblGrid>
+                <a:gridCol w="914400"/>
+                <a:gridCol w="1600200"/>
+                <a:gridCol w="2154676"/>
+                <a:gridCol w="2542161"/>
+                <a:gridCol w="2542161"/>
+              </a:tblGrid>
+              <a:tr h="370840">
+                <a:tc>
+                  <a:txBody>
+                    <a:bodyPr/>
+                    <a:lstStyle/>
+                    <a:p>
+                      <a:r>
+                        <a:rPr lang="en-GB" sz="1400" dirty="0" smtClean="0"/>
+                        <a:t>Task</a:t>
+                      </a:r>
+                      <a:endParaRPr lang="en-US" sz="1400" b="1" dirty="0"/>
+                    </a:p>
+                  </a:txBody>
+                  <a:tcPr/>
+                </a:tc>
+                <a:tc>
+                  <a:txBody>
+                    <a:bodyPr/>
+                    <a:lstStyle/>
+                    <a:p>
+                      <a:r>
+                        <a:rPr lang="en-GB" sz="1400" dirty="0" smtClean="0"/>
+                        <a:t>Tool</a:t>
+                      </a:r>
+                      <a:endParaRPr lang="en-US" sz="1400" b="1" dirty="0"/>
+                    </a:p>
+                  </a:txBody>
+                  <a:tcPr/>
+                </a:tc>
+                <a:tc>
+                  <a:txBody>
+                    <a:bodyPr/>
+                    <a:lstStyle/>
+                    <a:p>
+                      <a:r>
+                        <a:rPr lang="en-GB" sz="1400" dirty="0" smtClean="0"/>
+                        <a:t>What it</a:t>
+                      </a:r>
+                      <a:r>
+                        <a:rPr lang="en-GB" sz="1400" baseline="0" dirty="0" smtClean="0"/>
+                        <a:t> does</a:t>
+                      </a:r>
+                      <a:endParaRPr lang="en-US" sz="1400" b="1" dirty="0"/>
+                    </a:p>
+                  </a:txBody>
+                  <a:tcPr/>
+                </a:tc>
+                <a:tc>
+                  <a:txBody>
+                    <a:bodyPr/>
+                    <a:lstStyle/>
+                    <a:p>
+                      <a:r>
+                        <a:rPr lang="en-GB" sz="1400" dirty="0" smtClean="0"/>
+                        <a:t>Advantages</a:t>
+                      </a:r>
+                      <a:endParaRPr lang="en-US" sz="1400" b="1" dirty="0"/>
+                    </a:p>
+                  </a:txBody>
+                  <a:tcPr/>
+                </a:tc>
+                <a:tc>
+                  <a:txBody>
+                    <a:bodyPr/>
+                    <a:lstStyle/>
+                    <a:p>
+                      <a:r>
+                        <a:rPr lang="en-GB" sz="1400" dirty="0" smtClean="0"/>
+                        <a:t>Disadvantages</a:t>
+                      </a:r>
+                      <a:endParaRPr lang="en-US" sz="1400" b="1" dirty="0"/>
+                    </a:p>
+                  </a:txBody>
+                  <a:tcPr/>
+                </a:tc>
+              </a:tr>
+              <a:tr h="370840">
+                <a:tc>
+                  <a:txBody>
+                    <a:bodyPr/>
+                    <a:lstStyle/>
+                    <a:p>
+                      <a:r>
+                        <a:rPr lang="en-GB" sz="1400" dirty="0" smtClean="0"/>
+                        <a:t>Counting reads</a:t>
+                      </a:r>
+                      <a:endParaRPr lang="en-US" sz="1400" b="1" dirty="0"/>
+                    </a:p>
+                  </a:txBody>
+                  <a:tcPr/>
+                </a:tc>
+                <a:tc>
+                  <a:txBody>
+                    <a:bodyPr/>
+                    <a:lstStyle/>
+                    <a:p>
+                      <a:r>
+                        <a:rPr lang="en-GB" sz="1400" dirty="0" err="1" smtClean="0"/>
+                        <a:t>featureCounts</a:t>
+                      </a:r>
+                      <a:endParaRPr lang="en-US" sz="1400" b="0" dirty="0"/>
+                    </a:p>
+                  </a:txBody>
+                  <a:tcPr/>
+                </a:tc>
+                <a:tc>
+                  <a:txBody>
+                    <a:bodyPr/>
+                    <a:lstStyle/>
+                    <a:p>
+                      <a:r>
+                        <a:rPr lang="en-GB" sz="1400" dirty="0" smtClean="0"/>
+                        <a:t>Per</a:t>
+                      </a:r>
+                      <a:r>
+                        <a:rPr lang="en-GB" sz="1400" baseline="0" dirty="0" smtClean="0"/>
+                        <a:t> genes, per exons</a:t>
+                      </a:r>
+                    </a:p>
+                    <a:p>
+                      <a:r>
+                        <a:rPr lang="en-GB" sz="1400" baseline="0" dirty="0" smtClean="0"/>
+                        <a:t>SAF/GTF file + any number of BAM files</a:t>
+                      </a:r>
+                      <a:endParaRPr lang="en-US" sz="1400" b="0" dirty="0"/>
+                    </a:p>
+                  </a:txBody>
+                  <a:tcPr/>
+                </a:tc>
+                <a:tc>
+                  <a:txBody>
+                    <a:bodyPr/>
+                    <a:lstStyle/>
+                    <a:p>
+                      <a:r>
+                        <a:rPr lang="en-GB" sz="1400" dirty="0" smtClean="0"/>
+                        <a:t>Can count</a:t>
+                      </a:r>
+                      <a:r>
+                        <a:rPr lang="en-GB" sz="1400" baseline="0" dirty="0" smtClean="0"/>
+                        <a:t> fragments</a:t>
+                      </a:r>
+                    </a:p>
+                    <a:p>
+                      <a:r>
+                        <a:rPr lang="en-GB" sz="1400" baseline="0" dirty="0" smtClean="0"/>
+                        <a:t>Mapping quality filter</a:t>
+                      </a:r>
+                    </a:p>
+                    <a:p>
+                      <a:r>
+                        <a:rPr lang="en-GB" sz="1400" baseline="0" dirty="0" smtClean="0"/>
+                        <a:t>Efficient</a:t>
+                      </a:r>
+                    </a:p>
+                    <a:p>
+                      <a:r>
+                        <a:rPr lang="en-GB" sz="1400" baseline="0" dirty="0" smtClean="0"/>
+                        <a:t>Count table output</a:t>
+                      </a:r>
+                    </a:p>
+                    <a:p>
+                      <a:r>
+                        <a:rPr lang="en-GB" sz="1400" baseline="0" dirty="0" smtClean="0"/>
+                        <a:t>Good documentation</a:t>
+                      </a:r>
+                      <a:endParaRPr lang="en-US" sz="1400" b="0" dirty="0"/>
+                    </a:p>
+                  </a:txBody>
+                  <a:tcPr/>
+                </a:tc>
+                <a:tc>
+                  <a:txBody>
+                    <a:bodyPr/>
+                    <a:lstStyle/>
+                    <a:p>
+                      <a:r>
+                        <a:rPr lang="en-GB" sz="1400" dirty="0" smtClean="0"/>
+                        <a:t>Erratic </a:t>
+                      </a:r>
+                      <a:r>
+                        <a:rPr lang="en-GB" sz="1400" dirty="0" err="1" smtClean="0"/>
+                        <a:t>behavior</a:t>
+                      </a:r>
+                      <a:r>
+                        <a:rPr lang="en-GB" sz="1400" dirty="0" smtClean="0"/>
+                        <a:t> with single</a:t>
+                      </a:r>
+                      <a:r>
+                        <a:rPr lang="en-GB" sz="1400" baseline="0" dirty="0" smtClean="0"/>
+                        <a:t> bp BED files? </a:t>
+                      </a:r>
+                      <a:r>
+                        <a:rPr lang="en-GB" sz="1400" baseline="0" dirty="0" smtClean="0">
+                          <a:sym typeface="Wingdings" panose="05000000000000000000" pitchFamily="2" charset="2"/>
+                        </a:rPr>
+                        <a:t> can be controlled using the –O option which will count reads that overlap with more than one feature</a:t>
+                      </a:r>
+                      <a:endParaRPr lang="en-US" sz="1400" b="0" dirty="0"/>
+                    </a:p>
+                  </a:txBody>
+                  <a:tcPr/>
+                </a:tc>
+              </a:tr>
+              <a:tr h="370840">
+                <a:tc>
+                  <a:txBody>
+                    <a:bodyPr/>
+                    <a:lstStyle/>
+                    <a:p>
+                      <a:endParaRPr lang="en-US" sz="1400" b="1" dirty="0"/>
+                    </a:p>
+                  </a:txBody>
+                  <a:tcPr>
+                    <a:lnB w="19050" cap="flat" cmpd="sng" algn="ctr">
+                      <a:solidFill>
+                        <a:schemeClr val="tx1"/>
+                      </a:solidFill>
+                      <a:prstDash val="solid"/>
+                      <a:round/>
+                      <a:headEnd type="none" w="med" len="med"/>
+                      <a:tailEnd type="none" w="med" len="med"/>
+                    </a:lnB>
+                  </a:tcPr>
+                </a:tc>
+                <a:tc>
+                  <a:txBody>
+                    <a:bodyPr/>
+                    <a:lstStyle/>
+                    <a:p>
+                      <a:r>
+                        <a:rPr lang="en-GB" sz="1400" dirty="0" err="1" smtClean="0"/>
+                        <a:t>coverageBed</a:t>
+                      </a:r>
+                      <a:endParaRPr lang="en-US" sz="1400" b="0" dirty="0"/>
+                    </a:p>
+                  </a:txBody>
+                  <a:tcPr>
+                    <a:lnB w="19050" cap="flat" cmpd="sng" algn="ctr">
+                      <a:solidFill>
+                        <a:schemeClr val="tx1"/>
+                      </a:solidFill>
+                      <a:prstDash val="solid"/>
+                      <a:round/>
+                      <a:headEnd type="none" w="med" len="med"/>
+                      <a:tailEnd type="none" w="med" len="med"/>
+                    </a:lnB>
+                  </a:tcPr>
+                </a:tc>
+                <a:tc>
+                  <a:txBody>
+                    <a:bodyPr/>
+                    <a:lstStyle/>
+                    <a:p>
+                      <a:r>
+                        <a:rPr lang="en-GB" sz="1400" dirty="0" smtClean="0"/>
+                        <a:t>Per variants</a:t>
+                      </a:r>
+                    </a:p>
+                    <a:p>
+                      <a:r>
+                        <a:rPr lang="en-GB" sz="1400" dirty="0" smtClean="0"/>
+                        <a:t>1</a:t>
+                      </a:r>
+                      <a:r>
+                        <a:rPr lang="en-GB" sz="1400" baseline="0" dirty="0" smtClean="0"/>
+                        <a:t> BAM + 1 BED</a:t>
+                      </a:r>
+                      <a:endParaRPr lang="en-US" sz="1400" b="0" dirty="0"/>
+                    </a:p>
+                  </a:txBody>
+                  <a:tcPr>
+                    <a:lnB w="19050" cap="flat" cmpd="sng" algn="ctr">
+                      <a:solidFill>
+                        <a:schemeClr val="tx1"/>
+                      </a:solidFill>
+                      <a:prstDash val="solid"/>
+                      <a:round/>
+                      <a:headEnd type="none" w="med" len="med"/>
+                      <a:tailEnd type="none" w="med" len="med"/>
+                    </a:lnB>
+                  </a:tcPr>
+                </a:tc>
+                <a:tc>
+                  <a:txBody>
+                    <a:bodyPr/>
+                    <a:lstStyle/>
+                    <a:p>
+                      <a:r>
+                        <a:rPr lang="en-GB" sz="1400" dirty="0" smtClean="0"/>
+                        <a:t>Straight-forward,</a:t>
+                      </a:r>
+                      <a:r>
+                        <a:rPr lang="en-GB" sz="1400" baseline="0" dirty="0" smtClean="0"/>
+                        <a:t> can be piped with </a:t>
+                      </a:r>
+                      <a:r>
+                        <a:rPr lang="en-GB" sz="1400" baseline="0" dirty="0" err="1" smtClean="0"/>
+                        <a:t>samtools</a:t>
+                      </a:r>
+                      <a:endParaRPr lang="en-GB" sz="1400" b="0" dirty="0" smtClean="0"/>
+                    </a:p>
+                  </a:txBody>
+                  <a:tcPr>
+                    <a:lnB w="19050" cap="flat" cmpd="sng" algn="ctr">
+                      <a:solidFill>
+                        <a:schemeClr val="tx1"/>
+                      </a:solidFill>
+                      <a:prstDash val="solid"/>
+                      <a:round/>
+                      <a:headEnd type="none" w="med" len="med"/>
+                      <a:tailEnd type="none" w="med" len="med"/>
+                    </a:lnB>
+                  </a:tcPr>
+                </a:tc>
+                <a:tc>
+                  <a:txBody>
+                    <a:bodyPr/>
+                    <a:lstStyle/>
+                    <a:p>
+                      <a:r>
+                        <a:rPr lang="en-GB" sz="1400" dirty="0" smtClean="0"/>
+                        <a:t>Slow</a:t>
+                      </a:r>
+                    </a:p>
+                    <a:p>
+                      <a:r>
+                        <a:rPr lang="en-GB" sz="1400" dirty="0" smtClean="0"/>
+                        <a:t>No fragment counting</a:t>
+                      </a:r>
+                      <a:endParaRPr lang="en-GB" sz="1400" b="0" dirty="0" smtClean="0"/>
+                    </a:p>
+                  </a:txBody>
+                  <a:tcPr>
+                    <a:lnB w="19050" cap="flat" cmpd="sng" algn="ctr">
+                      <a:solidFill>
+                        <a:schemeClr val="tx1"/>
+                      </a:solidFill>
+                      <a:prstDash val="solid"/>
+                      <a:round/>
+                      <a:headEnd type="none" w="med" len="med"/>
+                      <a:tailEnd type="none" w="med" len="med"/>
+                    </a:lnB>
+                  </a:tcPr>
+                </a:tc>
+              </a:tr>
+              <a:tr h="370840">
+                <a:tc>
+                  <a:txBody>
+                    <a:bodyPr/>
+                    <a:lstStyle/>
+                    <a:p>
+                      <a:r>
+                        <a:rPr lang="en-GB" sz="1400" dirty="0" smtClean="0"/>
+                        <a:t>ASE</a:t>
+                      </a:r>
+                      <a:endParaRPr lang="en-US" sz="1400" b="1" dirty="0"/>
+                    </a:p>
+                  </a:txBody>
+                  <a:tcPr>
+                    <a:lnT w="19050" cap="flat" cmpd="sng" algn="ctr">
+                      <a:solidFill>
+                        <a:schemeClr val="tx1"/>
+                      </a:solidFill>
+                      <a:prstDash val="solid"/>
+                      <a:round/>
+                      <a:headEnd type="none" w="med" len="med"/>
+                      <a:tailEnd type="none" w="med" len="med"/>
+                    </a:lnT>
+                  </a:tcPr>
+                </a:tc>
+                <a:tc>
+                  <a:txBody>
+                    <a:bodyPr/>
+                    <a:lstStyle/>
+                    <a:p>
+                      <a:r>
+                        <a:rPr lang="en-GB" sz="1400" dirty="0" err="1" smtClean="0"/>
+                        <a:t>DESeq</a:t>
+                      </a:r>
+                      <a:endParaRPr lang="en-US" sz="1400" b="0" dirty="0"/>
+                    </a:p>
+                  </a:txBody>
+                  <a:tcPr>
+                    <a:lnT w="19050" cap="flat" cmpd="sng" algn="ctr">
+                      <a:solidFill>
+                        <a:schemeClr val="tx1"/>
+                      </a:solidFill>
+                      <a:prstDash val="solid"/>
+                      <a:round/>
+                      <a:headEnd type="none" w="med" len="med"/>
+                      <a:tailEnd type="none" w="med" len="med"/>
+                    </a:lnT>
+                  </a:tcPr>
+                </a:tc>
+                <a:tc>
+                  <a:txBody>
+                    <a:bodyPr/>
+                    <a:lstStyle/>
+                    <a:p>
+                      <a:endParaRPr lang="en-US" sz="1400" b="0" dirty="0"/>
+                    </a:p>
+                  </a:txBody>
+                  <a:tcPr>
+                    <a:lnT w="19050" cap="flat" cmpd="sng" algn="ctr">
+                      <a:solidFill>
+                        <a:schemeClr val="tx1"/>
+                      </a:solidFill>
+                      <a:prstDash val="solid"/>
+                      <a:round/>
+                      <a:headEnd type="none" w="med" len="med"/>
+                      <a:tailEnd type="none" w="med" len="med"/>
+                    </a:lnT>
+                  </a:tcPr>
+                </a:tc>
+                <a:tc>
+                  <a:txBody>
+                    <a:bodyPr/>
+                    <a:lstStyle/>
+                    <a:p>
+                      <a:r>
+                        <a:rPr lang="en-GB" sz="1400" b="0" dirty="0" smtClean="0"/>
+                        <a:t>Straight-forward</a:t>
+                      </a:r>
+                      <a:r>
+                        <a:rPr lang="en-GB" sz="1400" b="0" baseline="0" dirty="0" smtClean="0"/>
+                        <a:t> usage</a:t>
+                      </a:r>
+                    </a:p>
+                    <a:p>
+                      <a:r>
+                        <a:rPr lang="en-GB" sz="1400" b="0" baseline="0" dirty="0" smtClean="0"/>
+                        <a:t>Established method</a:t>
+                      </a:r>
+                    </a:p>
+                  </a:txBody>
+                  <a:tcPr>
+                    <a:lnT w="19050" cap="flat" cmpd="sng" algn="ctr">
+                      <a:solidFill>
+                        <a:schemeClr val="tx1"/>
+                      </a:solidFill>
+                      <a:prstDash val="solid"/>
+                      <a:round/>
+                      <a:headEnd type="none" w="med" len="med"/>
+                      <a:tailEnd type="none" w="med" len="med"/>
+                    </a:lnT>
+                  </a:tcPr>
+                </a:tc>
+                <a:tc>
+                  <a:txBody>
+                    <a:bodyPr/>
+                    <a:lstStyle/>
+                    <a:p>
+                      <a:r>
+                        <a:rPr lang="en-GB" sz="1400" b="0" dirty="0" smtClean="0"/>
+                        <a:t>Do the assumptions</a:t>
+                      </a:r>
+                      <a:r>
+                        <a:rPr lang="en-GB" sz="1400" b="0" baseline="0" dirty="0" smtClean="0"/>
+                        <a:t> hold for the comparison between two alleles?</a:t>
+                      </a:r>
+                      <a:endParaRPr lang="en-US" sz="1400" b="0" dirty="0"/>
+                    </a:p>
+                  </a:txBody>
+                  <a:tcPr>
+                    <a:lnT w="19050" cap="flat" cmpd="sng" algn="ctr">
+                      <a:solidFill>
+                        <a:schemeClr val="tx1"/>
+                      </a:solidFill>
+                      <a:prstDash val="solid"/>
+                      <a:round/>
+                      <a:headEnd type="none" w="med" len="med"/>
+                      <a:tailEnd type="none" w="med" len="med"/>
+                    </a:lnT>
+                  </a:tcPr>
+                </a:tc>
+              </a:tr>
+              <a:tr h="370840">
+                <a:tc>
+                  <a:txBody>
+                    <a:bodyPr/>
+                    <a:lstStyle/>
+                    <a:p>
+                      <a:endParaRPr lang="en-US" sz="1400" b="1" dirty="0"/>
+                    </a:p>
+                  </a:txBody>
+                  <a:tcPr/>
+                </a:tc>
+                <a:tc>
+                  <a:txBody>
+                    <a:bodyPr/>
+                    <a:lstStyle/>
+                    <a:p>
+                      <a:r>
+                        <a:rPr lang="en-GB" sz="1400" dirty="0" smtClean="0"/>
+                        <a:t>Chi-square</a:t>
+                      </a:r>
+                      <a:r>
+                        <a:rPr lang="en-GB" sz="1400" baseline="0" dirty="0" smtClean="0"/>
+                        <a:t> test</a:t>
+                      </a:r>
+                      <a:endParaRPr lang="en-US" sz="1400" b="0" dirty="0"/>
+                    </a:p>
+                  </a:txBody>
+                  <a:tcPr/>
+                </a:tc>
+                <a:tc>
+                  <a:txBody>
+                    <a:bodyPr/>
+                    <a:lstStyle/>
+                    <a:p>
+                      <a:endParaRPr lang="en-US" sz="1400" b="0" dirty="0"/>
+                    </a:p>
+                  </a:txBody>
+                  <a:tcPr/>
+                </a:tc>
+                <a:tc>
+                  <a:txBody>
+                    <a:bodyPr/>
+                    <a:lstStyle/>
+                    <a:p>
+                      <a:endParaRPr lang="en-US" sz="1400" b="0" dirty="0"/>
+                    </a:p>
+                  </a:txBody>
+                  <a:tcPr/>
+                </a:tc>
+                <a:tc>
+                  <a:txBody>
+                    <a:bodyPr/>
+                    <a:lstStyle/>
+                    <a:p>
+                      <a:endParaRPr lang="en-US" sz="1400" b="0" dirty="0"/>
+                    </a:p>
+                  </a:txBody>
+                  <a:tcPr/>
+                </a:tc>
+              </a:tr>
+              <a:tr h="370840">
+                <a:tc>
+                  <a:txBody>
+                    <a:bodyPr/>
+                    <a:lstStyle/>
+                    <a:p>
+                      <a:endParaRPr lang="en-US" sz="1400" b="1" dirty="0"/>
+                    </a:p>
+                  </a:txBody>
+                  <a:tcPr/>
+                </a:tc>
+                <a:tc>
+                  <a:txBody>
+                    <a:bodyPr/>
+                    <a:lstStyle/>
+                    <a:p>
+                      <a:r>
+                        <a:rPr lang="en-GB" sz="1400" dirty="0" smtClean="0"/>
+                        <a:t>Bayesian classifier</a:t>
+                      </a:r>
+                      <a:endParaRPr lang="en-US" sz="1400" b="0" dirty="0"/>
+                    </a:p>
+                  </a:txBody>
+                  <a:tcPr/>
+                </a:tc>
+                <a:tc>
+                  <a:txBody>
+                    <a:bodyPr/>
+                    <a:lstStyle/>
+                    <a:p>
+                      <a:endParaRPr lang="en-US" sz="1400" b="0" dirty="0"/>
+                    </a:p>
+                  </a:txBody>
+                  <a:tcPr/>
+                </a:tc>
+                <a:tc>
+                  <a:txBody>
+                    <a:bodyPr/>
+                    <a:lstStyle/>
+                    <a:p>
+                      <a:endParaRPr lang="en-US" sz="1400" b="0" dirty="0"/>
+                    </a:p>
+                  </a:txBody>
+                  <a:tcPr/>
+                </a:tc>
+                <a:tc>
+                  <a:txBody>
+                    <a:bodyPr/>
+                    <a:lstStyle/>
+                    <a:p>
+                      <a:r>
+                        <a:rPr lang="en-GB" sz="1400" b="0" dirty="0" smtClean="0"/>
+                        <a:t>Needs DNA sample</a:t>
+                      </a:r>
+                      <a:endParaRPr lang="en-US" sz="1400" b="0" dirty="0"/>
+                    </a:p>
+                  </a:txBody>
+                  <a:tcPr/>
+                </a:tc>
+              </a:tr>
+            </a:tbl>
+          </a:graphicData>
+        </a:graphic>
+      </p:graphicFrame>
+    </p:spTree>
+    <p:extLst>
+      <p:ext uri="{BB962C8B-B14F-4D97-AF65-F5344CB8AC3E}">
+        <p14:creationId xmlns:p14="http://schemas.microsoft.com/office/powerpoint/2010/main" xmlns="" val="2843641524"/>
       </p:ext>
     </p:extLst>
   </p:cSld>

</xml_diff>